<commit_message>
[2023. 01. 09] 1차 test 버전 - 보완(10:25)
</commit_message>
<xml_diff>
--- a/src/main/webapp/WEB-INF/Files/요약본_sample.pptx
+++ b/src/main/webapp/WEB-INF/Files/요약본_sample.pptx
@@ -84,7 +84,7 @@
       </p:grpSpPr>
       <p:sp>
         <p:nvSpPr>
-          <p:cNvPr id="259943055" name="Text">
+          <p:cNvPr id="1021522667" name="Text">
     </p:cNvPr>
           <p:cNvSpPr>
             <a:spLocks noGrp="1"/>
@@ -130,7 +130,7 @@
       </p:sp>
       <p:sp>
         <p:nvSpPr>
-          <p:cNvPr id="1700209437" name="Line"/>
+          <p:cNvPr id="152731236" name="Line"/>
           <p:cNvSpPr>
             <a:spLocks noGrp="1"/>
           </p:cNvSpPr>
@@ -164,7 +164,7 @@
       </p:sp>
       <p:sp>
         <p:nvSpPr>
-          <p:cNvPr id="1960358194" name="Text">
+          <p:cNvPr id="2093335441" name="Text">
     </p:cNvPr>
           <p:cNvSpPr>
             <a:spLocks noGrp="1"/>
@@ -228,7 +228,7 @@
       </p:sp>
       <p:sp>
         <p:nvSpPr>
-          <p:cNvPr id="1788979278" name="Rectangle"/>
+          <p:cNvPr id="2091867623" name="Rectangle"/>
           <p:cNvSpPr>
             <a:spLocks noGrp="1"/>
           </p:cNvSpPr>
@@ -262,7 +262,7 @@
       </p:sp>
       <p:sp>
         <p:nvSpPr>
-          <p:cNvPr id="2030898371" name="Rectangle"/>
+          <p:cNvPr id="319191420" name="Rectangle"/>
           <p:cNvSpPr>
             <a:spLocks noGrp="1"/>
           </p:cNvSpPr>
@@ -296,7 +296,7 @@
       </p:sp>
       <p:sp>
         <p:nvSpPr>
-          <p:cNvPr id="631150388" name="Rectangle"/>
+          <p:cNvPr id="1228262438" name="Rectangle"/>
           <p:cNvSpPr>
             <a:spLocks noGrp="1"/>
           </p:cNvSpPr>
@@ -330,7 +330,7 @@
       </p:sp>
       <p:sp>
         <p:nvSpPr>
-          <p:cNvPr id="343860116" name="Text">
+          <p:cNvPr id="457066458" name="Text">
     </p:cNvPr>
           <p:cNvSpPr>
             <a:spLocks noGrp="1"/>
@@ -375,7 +375,7 @@
       </p:sp>
       <p:sp>
         <p:nvSpPr>
-          <p:cNvPr id="1937427085" name="Text">
+          <p:cNvPr id="494428479" name="Text">
     </p:cNvPr>
           <p:cNvSpPr>
             <a:spLocks noGrp="1"/>
@@ -421,7 +421,7 @@
                 <a:ea typeface="맑은 고딕"/>
                 <a:cs typeface="맑은 고딕"/>
               </a:rPr>
-              <a:t>12/22</a:t>
+              <a:t>[보류]</a:t>
             </a:r>
             <a:br/>
           </a:p>
@@ -429,7 +429,7 @@
       </p:sp>
       <p:sp>
         <p:nvSpPr>
-          <p:cNvPr id="1652603701" name="Text">
+          <p:cNvPr id="1033188981" name="Text">
     </p:cNvPr>
           <p:cNvSpPr>
             <a:spLocks noGrp="1"/>
@@ -475,7 +475,7 @@
                 <a:ea typeface="맑은 고딕"/>
                 <a:cs typeface="맑은 고딕"/>
               </a:rPr>
-              <a:t> [E-BIZ] 거래처 정보화면 임원 별도처리</a:t>
+              <a:t> [e-Biz] 매출원장(ZSDR5370)보완</a:t>
             </a:r>
             <a:br/>
           </a:p>
@@ -483,7 +483,7 @@
       </p:sp>
       <p:sp>
         <p:nvSpPr>
-          <p:cNvPr id="863418214" name="Text">
+          <p:cNvPr id="1520867613" name="Text">
     </p:cNvPr>
           <p:cNvSpPr>
             <a:spLocks noGrp="1"/>
@@ -535,7 +535,7 @@
       </p:sp>
       <p:sp>
         <p:nvSpPr>
-          <p:cNvPr id="1350013151" name="Text">
+          <p:cNvPr id="860816644" name="Text">
     </p:cNvPr>
           <p:cNvSpPr>
             <a:spLocks noGrp="1"/>
@@ -587,7 +587,7 @@
       </p:sp>
       <p:sp>
         <p:nvSpPr>
-          <p:cNvPr id="1979455230" name="Text">
+          <p:cNvPr id="1843461067" name="Text">
     </p:cNvPr>
           <p:cNvSpPr>
             <a:spLocks noGrp="1"/>
@@ -633,7 +633,7 @@
                 <a:ea typeface="맑은 고딕"/>
                 <a:cs typeface="맑은 고딕"/>
               </a:rPr>
-              <a:t> [E-BIZ] e-Biz 거래처 정보화면 개선</a:t>
+              <a:t> [e-Biz] 매출원장(ZSDR5370)보완</a:t>
             </a:r>
             <a:br/>
             <a:r>
@@ -642,7 +642,7 @@
                 <a:ea typeface="맑은 고딕"/>
                 <a:cs typeface="맑은 고딕"/>
               </a:rPr>
-              <a:t> [E-BIZ] 사후적립 통제기준 변경</a:t>
+              <a:t> [e-Biz/FLBIZ] 감사 대비 어플리케이션 로그 기능</a:t>
             </a:r>
             <a:br/>
           </a:p>
@@ -650,7 +650,7 @@
       </p:sp>
       <p:sp>
         <p:nvSpPr>
-          <p:cNvPr id="2014609912" name="Text">
+          <p:cNvPr id="1560157713" name="Text">
     </p:cNvPr>
           <p:cNvSpPr>
             <a:spLocks noGrp="1"/>
@@ -695,7 +695,7 @@
       </p:sp>
       <p:sp>
         <p:nvSpPr>
-          <p:cNvPr id="1833575394" name="Text">
+          <p:cNvPr id="917145830" name="Text">
     </p:cNvPr>
           <p:cNvSpPr>
             <a:spLocks noGrp="1"/>
@@ -747,7 +747,7 @@
       </p:sp>
       <p:sp>
         <p:nvSpPr>
-          <p:cNvPr id="1830487382" name="Text">
+          <p:cNvPr id="1575421441" name="Text">
     </p:cNvPr>
           <p:cNvSpPr>
             <a:spLocks noGrp="1"/>
@@ -796,7 +796,7 @@
       </p:sp>
       <p:sp>
         <p:nvSpPr>
-          <p:cNvPr id="832056641" name="Text">
+          <p:cNvPr id="1489418233" name="Text">
     </p:cNvPr>
           <p:cNvSpPr>
             <a:spLocks noGrp="1"/>
@@ -845,7 +845,7 @@
       </p:sp>
       <p:sp>
         <p:nvSpPr>
-          <p:cNvPr id="1834967499" name="Text">
+          <p:cNvPr id="1952719974" name="Text">
     </p:cNvPr>
           <p:cNvSpPr>
             <a:spLocks noGrp="1"/>
@@ -900,7 +900,7 @@
       </p:sp>
       <p:sp>
         <p:nvSpPr>
-          <p:cNvPr id="1362496177" name="Text">
+          <p:cNvPr id="384528308" name="Text">
     </p:cNvPr>
           <p:cNvSpPr>
             <a:spLocks noGrp="1"/>
@@ -955,7 +955,7 @@
       </p:sp>
       <p:sp>
         <p:nvSpPr>
-          <p:cNvPr id="1689420916" name="Text">
+          <p:cNvPr id="1935254630" name="Text">
     </p:cNvPr>
           <p:cNvSpPr>
             <a:spLocks noGrp="1"/>
@@ -1010,7 +1010,7 @@
       </p:sp>
       <p:sp>
         <p:nvSpPr>
-          <p:cNvPr id="338710406" name="Text">
+          <p:cNvPr id="508411019" name="Text">
     </p:cNvPr>
           <p:cNvSpPr>
             <a:spLocks noGrp="1"/>
@@ -1074,7 +1074,7 @@
       </p:sp>
       <p:sp>
         <p:nvSpPr>
-          <p:cNvPr id="49755634" name="Text">
+          <p:cNvPr id="1272970288" name="Text">
     </p:cNvPr>
           <p:cNvSpPr>
             <a:spLocks noGrp="1"/>
@@ -1129,7 +1129,7 @@
       </p:sp>
       <p:sp>
         <p:nvSpPr>
-          <p:cNvPr id="1668666527" name="Text">
+          <p:cNvPr id="109358128" name="Text">
     </p:cNvPr>
           <p:cNvSpPr>
             <a:spLocks noGrp="1"/>
@@ -1184,7 +1184,7 @@
       </p:sp>
       <p:sp>
         <p:nvSpPr>
-          <p:cNvPr id="328498593" name="Text">
+          <p:cNvPr id="952128018" name="Text">
     </p:cNvPr>
           <p:cNvSpPr>
             <a:spLocks noGrp="1"/>
@@ -1239,7 +1239,7 @@
       </p:sp>
       <p:sp>
         <p:nvSpPr>
-          <p:cNvPr id="97410090" name="Text">
+          <p:cNvPr id="1268385893" name="Text">
     </p:cNvPr>
           <p:cNvSpPr>
             <a:spLocks noGrp="1"/>
@@ -1294,7 +1294,7 @@
       </p:sp>
       <p:sp>
         <p:nvSpPr>
-          <p:cNvPr id="1043182020" name="Text">
+          <p:cNvPr id="2131772250" name="Text">
     </p:cNvPr>
           <p:cNvSpPr>
             <a:spLocks noGrp="1"/>
@@ -1349,7 +1349,7 @@
       </p:sp>
       <p:sp>
         <p:nvSpPr>
-          <p:cNvPr id="1940999090" name="Text">
+          <p:cNvPr id="1549178276" name="Text">
     </p:cNvPr>
           <p:cNvSpPr>
             <a:spLocks noGrp="1"/>
@@ -1404,7 +1404,7 @@
       </p:sp>
       <p:sp>
         <p:nvSpPr>
-          <p:cNvPr id="1140345104" name="Text">
+          <p:cNvPr id="1723600126" name="Text">
     </p:cNvPr>
           <p:cNvSpPr>
             <a:spLocks noGrp="1"/>
@@ -1450,7 +1450,7 @@
                 <a:ea typeface="맑은 고딕"/>
                 <a:cs typeface="맑은 고딕"/>
               </a:rPr>
-              <a:t>12/02</a:t>
+              <a:t>[보류]</a:t>
             </a:r>
             <a:br/>
             <a:r>
@@ -1459,7 +1459,7 @@
                 <a:ea typeface="맑은 고딕"/>
                 <a:cs typeface="맑은 고딕"/>
               </a:rPr>
-              <a:t>12/13</a:t>
+              <a:t>01/02</a:t>
             </a:r>
             <a:br/>
           </a:p>
@@ -1467,7 +1467,7 @@
       </p:sp>
       <p:sp>
         <p:nvSpPr>
-          <p:cNvPr id="874537545" name="Text">
+          <p:cNvPr id="2113857900" name="Text">
     </p:cNvPr>
           <p:cNvSpPr>
             <a:spLocks noGrp="1"/>
@@ -1519,7 +1519,7 @@
       </p:sp>
       <p:sp>
         <p:nvSpPr>
-          <p:cNvPr id="1741702808" name="Text">
+          <p:cNvPr id="9010970" name="Text">
     </p:cNvPr>
           <p:cNvSpPr>
             <a:spLocks noGrp="1"/>
@@ -1565,7 +1565,7 @@
                 <a:ea typeface="맑은 고딕"/>
                 <a:cs typeface="맑은 고딕"/>
               </a:rPr>
-              <a:t> 1</a:t>
+              <a:t> [RMS] 시스템 개발 및 보완</a:t>
             </a:r>
             <a:br/>
             <a:r>
@@ -1574,7 +1574,7 @@
                 <a:ea typeface="맑은 고딕"/>
                 <a:cs typeface="맑은 고딕"/>
               </a:rPr>
-              <a:t> 2</a:t>
+              <a:t> [RMS] 1차 테스트</a:t>
             </a:r>
             <a:br/>
           </a:p>
@@ -1582,7 +1582,7 @@
       </p:sp>
       <p:sp>
         <p:nvSpPr>
-          <p:cNvPr id="516254987" name="Text">
+          <p:cNvPr id="1754935578" name="Text">
     </p:cNvPr>
           <p:cNvSpPr>
             <a:spLocks noGrp="1"/>
@@ -1627,7 +1627,7 @@
       </p:sp>
       <p:sp>
         <p:nvSpPr>
-          <p:cNvPr id="536090378" name="Text">
+          <p:cNvPr id="1850149643" name="Text">
     </p:cNvPr>
           <p:cNvSpPr>
             <a:spLocks noGrp="1"/>
@@ -1672,14 +1672,14 @@
                 <a:ea typeface="맑은 고딕"/>
                 <a:cs typeface="맑은 고딕"/>
               </a:rPr>
-              <a:t>미진행</a:t>
-            </a:r>
-          </a:p>
-        </p:txBody>
-      </p:sp>
-      <p:sp>
-        <p:nvSpPr>
-          <p:cNvPr id="678501527" name="Text">
+              <a:t>진행중</a:t>
+            </a:r>
+          </a:p>
+        </p:txBody>
+      </p:sp>
+      <p:sp>
+        <p:nvSpPr>
+          <p:cNvPr id="1685596710" name="Text">
     </p:cNvPr>
           <p:cNvSpPr>
             <a:spLocks noGrp="1"/>
@@ -1725,24 +1725,24 @@
                 <a:ea typeface="맑은 고딕"/>
                 <a:cs typeface="맑은 고딕"/>
               </a:rPr>
+              <a:t>90%</a:t>
+            </a:r>
+            <a:br/>
+            <a:r>
+              <a:rPr lang="ko" sz="1100">
+                <a:latin typeface="맑은 고딕"/>
+                <a:ea typeface="맑은 고딕"/>
+                <a:cs typeface="맑은 고딕"/>
+              </a:rPr>
               <a:t>[보류]</a:t>
             </a:r>
             <a:br/>
-            <a:r>
-              <a:rPr lang="ko" sz="1100">
-                <a:latin typeface="맑은 고딕"/>
-                <a:ea typeface="맑은 고딕"/>
-                <a:cs typeface="맑은 고딕"/>
-              </a:rPr>
-              <a:t>[보류]</a:t>
-            </a:r>
-            <a:br/>
-          </a:p>
-        </p:txBody>
-      </p:sp>
-      <p:sp>
-        <p:nvSpPr>
-          <p:cNvPr id="1307605895" name="Text">
+          </a:p>
+        </p:txBody>
+      </p:sp>
+      <p:sp>
+        <p:nvSpPr>
+          <p:cNvPr id="792918044" name="Text">
     </p:cNvPr>
           <p:cNvSpPr>
             <a:spLocks noGrp="1"/>
@@ -1787,7 +1787,7 @@
       </p:sp>
       <p:sp>
         <p:nvSpPr>
-          <p:cNvPr id="2020141575" name="Text">
+          <p:cNvPr id="375983631" name="Text">
     </p:cNvPr>
           <p:cNvSpPr>
             <a:spLocks noGrp="1"/>
@@ -1850,7 +1850,7 @@
       </p:sp>
       <p:sp>
         <p:nvSpPr>
-          <p:cNvPr id="1193012807" name="Text">
+          <p:cNvPr id="1084244122" name="Text">
     </p:cNvPr>
           <p:cNvSpPr>
             <a:spLocks noGrp="1"/>
@@ -1896,7 +1896,7 @@
                 <a:ea typeface="맑은 고딕"/>
                 <a:cs typeface="맑은 고딕"/>
               </a:rPr>
-              <a:t> t</a:t>
+              <a:t> [RMS] 1차 테스트</a:t>
             </a:r>
             <a:br/>
             <a:r>
@@ -1905,7 +1905,7 @@
                 <a:ea typeface="맑은 고딕"/>
                 <a:cs typeface="맑은 고딕"/>
               </a:rPr>
-              <a:t> s</a:t>
+              <a:t> [RMS] 2차 테스트</a:t>
             </a:r>
             <a:br/>
           </a:p>
@@ -1913,7 +1913,7 @@
       </p:sp>
       <p:sp>
         <p:nvSpPr>
-          <p:cNvPr id="1731123095" name="Text">
+          <p:cNvPr id="1697409970" name="Text">
     </p:cNvPr>
           <p:cNvSpPr>
             <a:spLocks noGrp="1"/>
@@ -1965,7 +1965,7 @@
       </p:sp>
       <p:sp>
         <p:nvSpPr>
-          <p:cNvPr id="701277366" name="Rectangle"/>
+          <p:cNvPr id="1570176275" name="Rectangle"/>
           <p:cNvSpPr>
             <a:spLocks noGrp="1"/>
           </p:cNvSpPr>
@@ -1980,7 +1980,7 @@
             <a:avLst/>
           </a:prstGeom>
           <a:solidFill>
-            <a:srgbClr val="00FF00"/>
+            <a:srgbClr val="FFFFFF"/>
           </a:solidFill>
           <a:ln w="12700">
             <a:solidFill>
@@ -1999,7 +1999,7 @@
       </p:sp>
       <p:sp>
         <p:nvSpPr>
-          <p:cNvPr id="382421850" name="Rectangle"/>
+          <p:cNvPr id="64068056" name="Rectangle"/>
           <p:cNvSpPr>
             <a:spLocks noGrp="1"/>
           </p:cNvSpPr>
@@ -2014,7 +2014,7 @@
             <a:avLst/>
           </a:prstGeom>
           <a:solidFill>
-            <a:srgbClr val="00FF00"/>
+            <a:srgbClr val="FFFFFF"/>
           </a:solidFill>
           <a:ln w="12700">
             <a:solidFill>
@@ -2033,7 +2033,7 @@
       </p:sp>
       <p:sp>
         <p:nvSpPr>
-          <p:cNvPr id="238745106" name="Text">
+          <p:cNvPr id="1102556584" name="Text">
     </p:cNvPr>
           <p:cNvSpPr>
             <a:spLocks noGrp="1"/>
@@ -2082,7 +2082,7 @@
       </p:sp>
       <p:sp>
         <p:nvSpPr>
-          <p:cNvPr id="523835949" name="Text">
+          <p:cNvPr id="1203781591" name="Text">
     </p:cNvPr>
           <p:cNvSpPr>
             <a:spLocks noGrp="1"/>
@@ -2127,14 +2127,14 @@
                 <a:ea typeface="맑은 고딕"/>
                 <a:cs typeface="맑은 고딕"/>
               </a:rPr>
-              <a:t>Z11-22-0019</a:t>
-            </a:r>
-          </a:p>
-        </p:txBody>
-      </p:sp>
-      <p:sp>
-        <p:nvSpPr>
-          <p:cNvPr id="1402791016" name="Text">
+              <a:t>4718</a:t>
+            </a:r>
+          </a:p>
+        </p:txBody>
+      </p:sp>
+      <p:sp>
+        <p:nvSpPr>
+          <p:cNvPr id="760495193" name="Text">
     </p:cNvPr>
           <p:cNvSpPr>
             <a:spLocks noGrp="1"/>
@@ -2179,14 +2179,14 @@
                 <a:ea typeface="맑은 고딕"/>
                 <a:cs typeface="맑은 고딕"/>
               </a:rPr>
-              <a:t>Field contents changed: I_PSTYP -&gt; 0</a:t>
-            </a:r>
-          </a:p>
-        </p:txBody>
-      </p:sp>
-      <p:sp>
-        <p:nvSpPr>
-          <p:cNvPr id="524412122" name="Text">
+              <a:t>update summary set sign="승인" where sum_id=1</a:t>
+            </a:r>
+          </a:p>
+        </p:txBody>
+      </p:sp>
+      <p:sp>
+        <p:nvSpPr>
+          <p:cNvPr id="583303026" name="Text">
     </p:cNvPr>
           <p:cNvSpPr>
             <a:spLocks noGrp="1"/>
@@ -2231,14 +2231,14 @@
                 <a:ea typeface="맑은 고딕"/>
                 <a:cs typeface="맑은 고딕"/>
               </a:rPr>
-              <a:t>2022.12.08</a:t>
-            </a:r>
-          </a:p>
-        </p:txBody>
-      </p:sp>
-      <p:sp>
-        <p:nvSpPr>
-          <p:cNvPr id="1183976262" name="Text">
+              <a:t>2023-01-05</a:t>
+            </a:r>
+          </a:p>
+        </p:txBody>
+      </p:sp>
+      <p:sp>
+        <p:nvSpPr>
+          <p:cNvPr id="1583504495" name="Text">
     </p:cNvPr>
           <p:cNvSpPr>
             <a:spLocks noGrp="1"/>
@@ -2293,7 +2293,7 @@
       </p:sp>
       <p:sp>
         <p:nvSpPr>
-          <p:cNvPr id="296589771" name="Text">
+          <p:cNvPr id="412810995" name="Text">
     </p:cNvPr>
           <p:cNvSpPr>
             <a:spLocks noGrp="1"/>
@@ -2348,7 +2348,7 @@
       </p:sp>
       <p:sp>
         <p:nvSpPr>
-          <p:cNvPr id="631672882" name="Text">
+          <p:cNvPr id="346079053" name="Text">
     </p:cNvPr>
           <p:cNvSpPr>
             <a:spLocks noGrp="1"/>
@@ -2403,7 +2403,7 @@
       </p:sp>
       <p:sp>
         <p:nvSpPr>
-          <p:cNvPr id="902940520" name="Text">
+          <p:cNvPr id="354319684" name="Text">
     </p:cNvPr>
           <p:cNvSpPr>
             <a:spLocks noGrp="1"/>
@@ -2455,7 +2455,7 @@
       </p:sp>
       <p:sp>
         <p:nvSpPr>
-          <p:cNvPr id="1674523311" name="Text">
+          <p:cNvPr id="1498667692" name="Text">
     </p:cNvPr>
           <p:cNvSpPr>
             <a:spLocks noGrp="1"/>
@@ -2507,7 +2507,7 @@
       </p:sp>
       <p:sp>
         <p:nvSpPr>
-          <p:cNvPr id="508660956" name="Text">
+          <p:cNvPr id="384944659" name="Text">
     </p:cNvPr>
           <p:cNvSpPr>
             <a:spLocks noGrp="1"/>
@@ -2559,7 +2559,7 @@
       </p:sp>
       <p:sp>
         <p:nvSpPr>
-          <p:cNvPr id="258451492" name="Text">
+          <p:cNvPr id="121259351" name="Text">
     </p:cNvPr>
           <p:cNvSpPr>
             <a:spLocks noGrp="1"/>
@@ -2611,7 +2611,7 @@
       </p:sp>
       <p:sp>
         <p:nvSpPr>
-          <p:cNvPr id="876004391" name="Text">
+          <p:cNvPr id="1630076073" name="Text">
     </p:cNvPr>
           <p:cNvSpPr>
             <a:spLocks noGrp="1"/>
@@ -2656,14 +2656,14 @@
                 <a:ea typeface="맑은 고딕"/>
                 <a:cs typeface="맑은 고딕"/>
               </a:rPr>
-              <a:t>SROH</a:t>
-            </a:r>
-          </a:p>
-        </p:txBody>
-      </p:sp>
-      <p:sp>
-        <p:nvSpPr>
-          <p:cNvPr id="787923524" name="Text">
+              <a:t>jelee01</a:t>
+            </a:r>
+          </a:p>
+        </p:txBody>
+      </p:sp>
+      <p:sp>
+        <p:nvSpPr>
+          <p:cNvPr id="652856474" name="Text">
     </p:cNvPr>
           <p:cNvSpPr>
             <a:spLocks noGrp="1"/>
@@ -2718,7 +2718,7 @@
       </p:sp>
       <p:sp>
         <p:nvSpPr>
-          <p:cNvPr id="1012112426" name="Text">
+          <p:cNvPr id="1053833990" name="Text">
     </p:cNvPr>
           <p:cNvSpPr>
             <a:spLocks noGrp="1"/>
@@ -2770,7 +2770,7 @@
       </p:sp>
       <p:sp>
         <p:nvSpPr>
-          <p:cNvPr id="239543564" name="Text">
+          <p:cNvPr id="1804976502" name="Text">
     </p:cNvPr>
           <p:cNvSpPr>
             <a:spLocks noGrp="1"/>
@@ -2825,7 +2825,7 @@
       </p:sp>
       <p:sp>
         <p:nvSpPr>
-          <p:cNvPr id="206757663" name="Text">
+          <p:cNvPr id="1300145433" name="Text">
     </p:cNvPr>
           <p:cNvSpPr>
             <a:spLocks noGrp="1"/>
@@ -2877,7 +2877,7 @@
       </p:sp>
       <p:sp>
         <p:nvSpPr>
-          <p:cNvPr id="338610227" name="Text">
+          <p:cNvPr id="630926640" name="Text">
     </p:cNvPr>
           <p:cNvSpPr>
             <a:spLocks noGrp="1"/>
@@ -2923,7 +2923,7 @@
       </p:sp>
       <p:pic>
         <p:nvPicPr>
-          <p:cNvPr id="1850838072" name="Picture">
+          <p:cNvPr id="436320864" name="Picture">
     </p:cNvPr>
           <p:cNvPicPr>
             <a:picLocks noChangeAspect="1"/>

</xml_diff>

<commit_message>
[2023-01-16 ~ 2023-01-19] folder 버전_ rms(TN)버전 v0.1.1
</commit_message>
<xml_diff>
--- a/src/main/webapp/WEB-INF/Files/요약본_sample.pptx
+++ b/src/main/webapp/WEB-INF/Files/요약본_sample.pptx
@@ -84,7 +84,7 @@
       </p:grpSpPr>
       <p:sp>
         <p:nvSpPr>
-          <p:cNvPr id="1021522667" name="Text">
+          <p:cNvPr id="284016454" name="Text">
     </p:cNvPr>
           <p:cNvSpPr>
             <a:spLocks noGrp="1"/>
@@ -130,7 +130,7 @@
       </p:sp>
       <p:sp>
         <p:nvSpPr>
-          <p:cNvPr id="152731236" name="Line"/>
+          <p:cNvPr id="185311536" name="Line"/>
           <p:cNvSpPr>
             <a:spLocks noGrp="1"/>
           </p:cNvSpPr>
@@ -164,7 +164,7 @@
       </p:sp>
       <p:sp>
         <p:nvSpPr>
-          <p:cNvPr id="2093335441" name="Text">
+          <p:cNvPr id="971119736" name="Text">
     </p:cNvPr>
           <p:cNvSpPr>
             <a:spLocks noGrp="1"/>
@@ -228,7 +228,7 @@
       </p:sp>
       <p:sp>
         <p:nvSpPr>
-          <p:cNvPr id="2091867623" name="Rectangle"/>
+          <p:cNvPr id="1421658963" name="Rectangle"/>
           <p:cNvSpPr>
             <a:spLocks noGrp="1"/>
           </p:cNvSpPr>
@@ -262,7 +262,7 @@
       </p:sp>
       <p:sp>
         <p:nvSpPr>
-          <p:cNvPr id="319191420" name="Rectangle"/>
+          <p:cNvPr id="701909261" name="Rectangle"/>
           <p:cNvSpPr>
             <a:spLocks noGrp="1"/>
           </p:cNvSpPr>
@@ -296,7 +296,7 @@
       </p:sp>
       <p:sp>
         <p:nvSpPr>
-          <p:cNvPr id="1228262438" name="Rectangle"/>
+          <p:cNvPr id="2130870054" name="Rectangle"/>
           <p:cNvSpPr>
             <a:spLocks noGrp="1"/>
           </p:cNvSpPr>
@@ -330,7 +330,7 @@
       </p:sp>
       <p:sp>
         <p:nvSpPr>
-          <p:cNvPr id="457066458" name="Text">
+          <p:cNvPr id="1445637474" name="Text">
     </p:cNvPr>
           <p:cNvSpPr>
             <a:spLocks noGrp="1"/>
@@ -370,12 +370,20 @@
               </a:defRPr>
             </a:pPr>
             <a:br/>
-          </a:p>
-        </p:txBody>
-      </p:sp>
-      <p:sp>
-        <p:nvSpPr>
-          <p:cNvPr id="494428479" name="Text">
+            <a:r>
+              <a:rPr lang="ko" sz="1100">
+                <a:latin typeface="맑은 고딕"/>
+                <a:ea typeface="맑은 고딕"/>
+                <a:cs typeface="맑은 고딕"/>
+              </a:rPr>
+              <a:t>5678</a:t>
+            </a:r>
+          </a:p>
+        </p:txBody>
+      </p:sp>
+      <p:sp>
+        <p:nvSpPr>
+          <p:cNvPr id="1694372519" name="Text">
     </p:cNvPr>
           <p:cNvSpPr>
             <a:spLocks noGrp="1"/>
@@ -421,15 +429,23 @@
                 <a:ea typeface="맑은 고딕"/>
                 <a:cs typeface="맑은 고딕"/>
               </a:rPr>
-              <a:t>[보류]</a:t>
+              <a:t>01/16</a:t>
             </a:r>
             <a:br/>
-          </a:p>
-        </p:txBody>
-      </p:sp>
-      <p:sp>
-        <p:nvSpPr>
-          <p:cNvPr id="1033188981" name="Text">
+            <a:r>
+              <a:rPr lang="ko" sz="1100">
+                <a:latin typeface="맑은 고딕"/>
+                <a:ea typeface="맑은 고딕"/>
+                <a:cs typeface="맑은 고딕"/>
+              </a:rPr>
+              <a:t>01/16</a:t>
+            </a:r>
+          </a:p>
+        </p:txBody>
+      </p:sp>
+      <p:sp>
+        <p:nvSpPr>
+          <p:cNvPr id="2138808596" name="Text">
     </p:cNvPr>
           <p:cNvSpPr>
             <a:spLocks noGrp="1"/>
@@ -475,15 +491,24 @@
                 <a:ea typeface="맑은 고딕"/>
                 <a:cs typeface="맑은 고딕"/>
               </a:rPr>
-              <a:t> [e-Biz] 매출원장(ZSDR5370)보완</a:t>
+              <a:t> 다</a:t>
             </a:r>
             <a:br/>
-          </a:p>
-        </p:txBody>
-      </p:sp>
-      <p:sp>
-        <p:nvSpPr>
-          <p:cNvPr id="1520867613" name="Text">
+            <a:r>
+              <a:rPr lang="ko" sz="1100">
+                <a:latin typeface="맑은 고딕"/>
+                <a:ea typeface="맑은 고딕"/>
+                <a:cs typeface="맑은 고딕"/>
+              </a:rPr>
+              <a:t> 라</a:t>
+            </a:r>
+            <a:br/>
+          </a:p>
+        </p:txBody>
+      </p:sp>
+      <p:sp>
+        <p:nvSpPr>
+          <p:cNvPr id="334240402" name="Text">
     </p:cNvPr>
           <p:cNvSpPr>
             <a:spLocks noGrp="1"/>
@@ -535,7 +560,7 @@
       </p:sp>
       <p:sp>
         <p:nvSpPr>
-          <p:cNvPr id="860816644" name="Text">
+          <p:cNvPr id="279897136" name="Text">
     </p:cNvPr>
           <p:cNvSpPr>
             <a:spLocks noGrp="1"/>
@@ -587,7 +612,7 @@
       </p:sp>
       <p:sp>
         <p:nvSpPr>
-          <p:cNvPr id="1843461067" name="Text">
+          <p:cNvPr id="72460200" name="Text">
     </p:cNvPr>
           <p:cNvSpPr>
             <a:spLocks noGrp="1"/>
@@ -633,7 +658,7 @@
                 <a:ea typeface="맑은 고딕"/>
                 <a:cs typeface="맑은 고딕"/>
               </a:rPr>
-              <a:t> [e-Biz] 매출원장(ZSDR5370)보완</a:t>
+              <a:t> 가</a:t>
             </a:r>
             <a:br/>
             <a:r>
@@ -642,7 +667,7 @@
                 <a:ea typeface="맑은 고딕"/>
                 <a:cs typeface="맑은 고딕"/>
               </a:rPr>
-              <a:t> [e-Biz/FLBIZ] 감사 대비 어플리케이션 로그 기능</a:t>
+              <a:t> 나</a:t>
             </a:r>
             <a:br/>
           </a:p>
@@ -650,7 +675,7 @@
       </p:sp>
       <p:sp>
         <p:nvSpPr>
-          <p:cNvPr id="1560157713" name="Text">
+          <p:cNvPr id="645973303" name="Text">
     </p:cNvPr>
           <p:cNvSpPr>
             <a:spLocks noGrp="1"/>
@@ -690,12 +715,20 @@
               </a:defRPr>
             </a:pPr>
             <a:br/>
-          </a:p>
-        </p:txBody>
-      </p:sp>
-      <p:sp>
-        <p:nvSpPr>
-          <p:cNvPr id="917145830" name="Text">
+            <a:r>
+              <a:rPr lang="ko" sz="1100">
+                <a:latin typeface="맑은 고딕"/>
+                <a:ea typeface="맑은 고딕"/>
+                <a:cs typeface="맑은 고딕"/>
+              </a:rPr>
+              <a:t>1234</a:t>
+            </a:r>
+          </a:p>
+        </p:txBody>
+      </p:sp>
+      <p:sp>
+        <p:nvSpPr>
+          <p:cNvPr id="1439396863" name="Text">
     </p:cNvPr>
           <p:cNvSpPr>
             <a:spLocks noGrp="1"/>
@@ -747,7 +780,7 @@
       </p:sp>
       <p:sp>
         <p:nvSpPr>
-          <p:cNvPr id="1575421441" name="Text">
+          <p:cNvPr id="841191954" name="Text">
     </p:cNvPr>
           <p:cNvSpPr>
             <a:spLocks noGrp="1"/>
@@ -796,7 +829,7 @@
       </p:sp>
       <p:sp>
         <p:nvSpPr>
-          <p:cNvPr id="1489418233" name="Text">
+          <p:cNvPr id="994451225" name="Text">
     </p:cNvPr>
           <p:cNvSpPr>
             <a:spLocks noGrp="1"/>
@@ -845,7 +878,7 @@
       </p:sp>
       <p:sp>
         <p:nvSpPr>
-          <p:cNvPr id="1952719974" name="Text">
+          <p:cNvPr id="466603067" name="Text">
     </p:cNvPr>
           <p:cNvSpPr>
             <a:spLocks noGrp="1"/>
@@ -900,7 +933,7 @@
       </p:sp>
       <p:sp>
         <p:nvSpPr>
-          <p:cNvPr id="384528308" name="Text">
+          <p:cNvPr id="362090550" name="Text">
     </p:cNvPr>
           <p:cNvSpPr>
             <a:spLocks noGrp="1"/>
@@ -955,7 +988,7 @@
       </p:sp>
       <p:sp>
         <p:nvSpPr>
-          <p:cNvPr id="1935254630" name="Text">
+          <p:cNvPr id="990421908" name="Text">
     </p:cNvPr>
           <p:cNvSpPr>
             <a:spLocks noGrp="1"/>
@@ -1010,7 +1043,7 @@
       </p:sp>
       <p:sp>
         <p:nvSpPr>
-          <p:cNvPr id="508411019" name="Text">
+          <p:cNvPr id="817745211" name="Text">
     </p:cNvPr>
           <p:cNvSpPr>
             <a:spLocks noGrp="1"/>
@@ -1074,7 +1107,7 @@
       </p:sp>
       <p:sp>
         <p:nvSpPr>
-          <p:cNvPr id="1272970288" name="Text">
+          <p:cNvPr id="1433825539" name="Text">
     </p:cNvPr>
           <p:cNvSpPr>
             <a:spLocks noGrp="1"/>
@@ -1129,7 +1162,7 @@
       </p:sp>
       <p:sp>
         <p:nvSpPr>
-          <p:cNvPr id="109358128" name="Text">
+          <p:cNvPr id="1759498043" name="Text">
     </p:cNvPr>
           <p:cNvSpPr>
             <a:spLocks noGrp="1"/>
@@ -1184,7 +1217,7 @@
       </p:sp>
       <p:sp>
         <p:nvSpPr>
-          <p:cNvPr id="952128018" name="Text">
+          <p:cNvPr id="381011383" name="Text">
     </p:cNvPr>
           <p:cNvSpPr>
             <a:spLocks noGrp="1"/>
@@ -1239,7 +1272,7 @@
       </p:sp>
       <p:sp>
         <p:nvSpPr>
-          <p:cNvPr id="1268385893" name="Text">
+          <p:cNvPr id="1220482639" name="Text">
     </p:cNvPr>
           <p:cNvSpPr>
             <a:spLocks noGrp="1"/>
@@ -1294,7 +1327,7 @@
       </p:sp>
       <p:sp>
         <p:nvSpPr>
-          <p:cNvPr id="2131772250" name="Text">
+          <p:cNvPr id="782731314" name="Text">
     </p:cNvPr>
           <p:cNvSpPr>
             <a:spLocks noGrp="1"/>
@@ -1349,7 +1382,7 @@
       </p:sp>
       <p:sp>
         <p:nvSpPr>
-          <p:cNvPr id="1549178276" name="Text">
+          <p:cNvPr id="941042890" name="Text">
     </p:cNvPr>
           <p:cNvSpPr>
             <a:spLocks noGrp="1"/>
@@ -1404,7 +1437,7 @@
       </p:sp>
       <p:sp>
         <p:nvSpPr>
-          <p:cNvPr id="1723600126" name="Text">
+          <p:cNvPr id="12049922" name="Text">
     </p:cNvPr>
           <p:cNvSpPr>
             <a:spLocks noGrp="1"/>
@@ -1450,7 +1483,7 @@
                 <a:ea typeface="맑은 고딕"/>
                 <a:cs typeface="맑은 고딕"/>
               </a:rPr>
-              <a:t>[보류]</a:t>
+              <a:t>01/06</a:t>
             </a:r>
             <a:br/>
             <a:r>
@@ -1459,15 +1492,14 @@
                 <a:ea typeface="맑은 고딕"/>
                 <a:cs typeface="맑은 고딕"/>
               </a:rPr>
-              <a:t>01/02</a:t>
-            </a:r>
-            <a:br/>
-          </a:p>
-        </p:txBody>
-      </p:sp>
-      <p:sp>
-        <p:nvSpPr>
-          <p:cNvPr id="2113857900" name="Text">
+              <a:t>01/06</a:t>
+            </a:r>
+          </a:p>
+        </p:txBody>
+      </p:sp>
+      <p:sp>
+        <p:nvSpPr>
+          <p:cNvPr id="806006069" name="Text">
     </p:cNvPr>
           <p:cNvSpPr>
             <a:spLocks noGrp="1"/>
@@ -1519,7 +1551,7 @@
       </p:sp>
       <p:sp>
         <p:nvSpPr>
-          <p:cNvPr id="9010970" name="Text">
+          <p:cNvPr id="578704670" name="Text">
     </p:cNvPr>
           <p:cNvSpPr>
             <a:spLocks noGrp="1"/>
@@ -1565,7 +1597,7 @@
                 <a:ea typeface="맑은 고딕"/>
                 <a:cs typeface="맑은 고딕"/>
               </a:rPr>
-              <a:t> [RMS] 시스템 개발 및 보완</a:t>
+              <a:t>ㄱ</a:t>
             </a:r>
             <a:br/>
             <a:r>
@@ -1574,7 +1606,7 @@
                 <a:ea typeface="맑은 고딕"/>
                 <a:cs typeface="맑은 고딕"/>
               </a:rPr>
-              <a:t> [RMS] 1차 테스트</a:t>
+              <a:t>ㄴ</a:t>
             </a:r>
             <a:br/>
           </a:p>
@@ -1582,7 +1614,7 @@
       </p:sp>
       <p:sp>
         <p:nvSpPr>
-          <p:cNvPr id="1754935578" name="Text">
+          <p:cNvPr id="588139751" name="Text">
     </p:cNvPr>
           <p:cNvSpPr>
             <a:spLocks noGrp="1"/>
@@ -1627,7 +1659,7 @@
       </p:sp>
       <p:sp>
         <p:nvSpPr>
-          <p:cNvPr id="1850149643" name="Text">
+          <p:cNvPr id="494391626" name="Text">
     </p:cNvPr>
           <p:cNvSpPr>
             <a:spLocks noGrp="1"/>
@@ -1672,14 +1704,14 @@
                 <a:ea typeface="맑은 고딕"/>
                 <a:cs typeface="맑은 고딕"/>
               </a:rPr>
-              <a:t>진행중</a:t>
-            </a:r>
-          </a:p>
-        </p:txBody>
-      </p:sp>
-      <p:sp>
-        <p:nvSpPr>
-          <p:cNvPr id="1685596710" name="Text">
+              <a:t>보류</a:t>
+            </a:r>
+          </a:p>
+        </p:txBody>
+      </p:sp>
+      <p:sp>
+        <p:nvSpPr>
+          <p:cNvPr id="2020713684" name="Text">
     </p:cNvPr>
           <p:cNvSpPr>
             <a:spLocks noGrp="1"/>
@@ -1725,7 +1757,7 @@
                 <a:ea typeface="맑은 고딕"/>
                 <a:cs typeface="맑은 고딕"/>
               </a:rPr>
-              <a:t>90%</a:t>
+              <a:t>[보류]</a:t>
             </a:r>
             <a:br/>
             <a:r>
@@ -1742,7 +1774,7 @@
       </p:sp>
       <p:sp>
         <p:nvSpPr>
-          <p:cNvPr id="792918044" name="Text">
+          <p:cNvPr id="687327329" name="Text">
     </p:cNvPr>
           <p:cNvSpPr>
             <a:spLocks noGrp="1"/>
@@ -1787,7 +1819,7 @@
       </p:sp>
       <p:sp>
         <p:nvSpPr>
-          <p:cNvPr id="375983631" name="Text">
+          <p:cNvPr id="2035269868" name="Text">
     </p:cNvPr>
           <p:cNvSpPr>
             <a:spLocks noGrp="1"/>
@@ -1850,7 +1882,7 @@
       </p:sp>
       <p:sp>
         <p:nvSpPr>
-          <p:cNvPr id="1084244122" name="Text">
+          <p:cNvPr id="1519497998" name="Text">
     </p:cNvPr>
           <p:cNvSpPr>
             <a:spLocks noGrp="1"/>
@@ -1896,7 +1928,7 @@
                 <a:ea typeface="맑은 고딕"/>
                 <a:cs typeface="맑은 고딕"/>
               </a:rPr>
-              <a:t> [RMS] 1차 테스트</a:t>
+              <a:t> 1</a:t>
             </a:r>
             <a:br/>
             <a:r>
@@ -1905,7 +1937,7 @@
                 <a:ea typeface="맑은 고딕"/>
                 <a:cs typeface="맑은 고딕"/>
               </a:rPr>
-              <a:t> [RMS] 2차 테스트</a:t>
+              <a:t> 2</a:t>
             </a:r>
             <a:br/>
           </a:p>
@@ -1913,7 +1945,7 @@
       </p:sp>
       <p:sp>
         <p:nvSpPr>
-          <p:cNvPr id="1697409970" name="Text">
+          <p:cNvPr id="800320396" name="Text">
     </p:cNvPr>
           <p:cNvSpPr>
             <a:spLocks noGrp="1"/>
@@ -1965,7 +1997,7 @@
       </p:sp>
       <p:sp>
         <p:nvSpPr>
-          <p:cNvPr id="1570176275" name="Rectangle"/>
+          <p:cNvPr id="957455067" name="Rectangle"/>
           <p:cNvSpPr>
             <a:spLocks noGrp="1"/>
           </p:cNvSpPr>
@@ -1999,7 +2031,7 @@
       </p:sp>
       <p:sp>
         <p:nvSpPr>
-          <p:cNvPr id="64068056" name="Rectangle"/>
+          <p:cNvPr id="1046377909" name="Rectangle"/>
           <p:cNvSpPr>
             <a:spLocks noGrp="1"/>
           </p:cNvSpPr>
@@ -2033,7 +2065,7 @@
       </p:sp>
       <p:sp>
         <p:nvSpPr>
-          <p:cNvPr id="1102556584" name="Text">
+          <p:cNvPr id="1770043571" name="Text">
     </p:cNvPr>
           <p:cNvSpPr>
             <a:spLocks noGrp="1"/>
@@ -2082,7 +2114,7 @@
       </p:sp>
       <p:sp>
         <p:nvSpPr>
-          <p:cNvPr id="1203781591" name="Text">
+          <p:cNvPr id="1507836292" name="Text">
     </p:cNvPr>
           <p:cNvSpPr>
             <a:spLocks noGrp="1"/>
@@ -2127,14 +2159,14 @@
                 <a:ea typeface="맑은 고딕"/>
                 <a:cs typeface="맑은 고딕"/>
               </a:rPr>
-              <a:t>4718</a:t>
-            </a:r>
-          </a:p>
-        </p:txBody>
-      </p:sp>
-      <p:sp>
-        <p:nvSpPr>
-          <p:cNvPr id="760495193" name="Text">
+              <a:t>76</a:t>
+            </a:r>
+          </a:p>
+        </p:txBody>
+      </p:sp>
+      <p:sp>
+        <p:nvSpPr>
+          <p:cNvPr id="1823297318" name="Text">
     </p:cNvPr>
           <p:cNvSpPr>
             <a:spLocks noGrp="1"/>
@@ -2179,14 +2211,14 @@
                 <a:ea typeface="맑은 고딕"/>
                 <a:cs typeface="맑은 고딕"/>
               </a:rPr>
-              <a:t>update summary set sign="승인" where sum_id=1</a:t>
-            </a:r>
-          </a:p>
-        </p:txBody>
-      </p:sp>
-      <p:sp>
-        <p:nvSpPr>
-          <p:cNvPr id="583303026" name="Text">
+              <a:t>66</a:t>
+            </a:r>
+          </a:p>
+        </p:txBody>
+      </p:sp>
+      <p:sp>
+        <p:nvSpPr>
+          <p:cNvPr id="563313883" name="Text">
     </p:cNvPr>
           <p:cNvSpPr>
             <a:spLocks noGrp="1"/>
@@ -2231,14 +2263,14 @@
                 <a:ea typeface="맑은 고딕"/>
                 <a:cs typeface="맑은 고딕"/>
               </a:rPr>
-              <a:t>2023-01-05</a:t>
-            </a:r>
-          </a:p>
-        </p:txBody>
-      </p:sp>
-      <p:sp>
-        <p:nvSpPr>
-          <p:cNvPr id="1583504495" name="Text">
+              <a:t>22</a:t>
+            </a:r>
+          </a:p>
+        </p:txBody>
+      </p:sp>
+      <p:sp>
+        <p:nvSpPr>
+          <p:cNvPr id="1295654266" name="Text">
     </p:cNvPr>
           <p:cNvSpPr>
             <a:spLocks noGrp="1"/>
@@ -2293,7 +2325,7 @@
       </p:sp>
       <p:sp>
         <p:nvSpPr>
-          <p:cNvPr id="412810995" name="Text">
+          <p:cNvPr id="1783510712" name="Text">
     </p:cNvPr>
           <p:cNvSpPr>
             <a:spLocks noGrp="1"/>
@@ -2348,7 +2380,7 @@
       </p:sp>
       <p:sp>
         <p:nvSpPr>
-          <p:cNvPr id="346079053" name="Text">
+          <p:cNvPr id="1813811368" name="Text">
     </p:cNvPr>
           <p:cNvSpPr>
             <a:spLocks noGrp="1"/>
@@ -2403,7 +2435,7 @@
       </p:sp>
       <p:sp>
         <p:nvSpPr>
-          <p:cNvPr id="354319684" name="Text">
+          <p:cNvPr id="1456692308" name="Text">
     </p:cNvPr>
           <p:cNvSpPr>
             <a:spLocks noGrp="1"/>
@@ -2448,14 +2480,14 @@
                 <a:ea typeface="맑은 고딕"/>
                 <a:cs typeface="맑은 고딕"/>
               </a:rPr>
-              <a:t> </a:t>
-            </a:r>
-          </a:p>
-        </p:txBody>
-      </p:sp>
-      <p:sp>
-        <p:nvSpPr>
-          <p:cNvPr id="1498667692" name="Text">
+              <a:t>tt</a:t>
+            </a:r>
+          </a:p>
+        </p:txBody>
+      </p:sp>
+      <p:sp>
+        <p:nvSpPr>
+          <p:cNvPr id="1260341817" name="Text">
     </p:cNvPr>
           <p:cNvSpPr>
             <a:spLocks noGrp="1"/>
@@ -2500,14 +2532,14 @@
                 <a:ea typeface="맑은 고딕"/>
                 <a:cs typeface="맑은 고딕"/>
               </a:rPr>
-              <a:t> </a:t>
-            </a:r>
-          </a:p>
-        </p:txBody>
-      </p:sp>
-      <p:sp>
-        <p:nvSpPr>
-          <p:cNvPr id="384944659" name="Text">
+              <a:t>w</a:t>
+            </a:r>
+          </a:p>
+        </p:txBody>
+      </p:sp>
+      <p:sp>
+        <p:nvSpPr>
+          <p:cNvPr id="1358908948" name="Text">
     </p:cNvPr>
           <p:cNvSpPr>
             <a:spLocks noGrp="1"/>
@@ -2552,14 +2584,14 @@
                 <a:ea typeface="맑은 고딕"/>
                 <a:cs typeface="맑은 고딕"/>
               </a:rPr>
-              <a:t> </a:t>
-            </a:r>
-          </a:p>
-        </p:txBody>
-      </p:sp>
-      <p:sp>
-        <p:nvSpPr>
-          <p:cNvPr id="121259351" name="Text">
+              <a:t>gere</a:t>
+            </a:r>
+          </a:p>
+        </p:txBody>
+      </p:sp>
+      <p:sp>
+        <p:nvSpPr>
+          <p:cNvPr id="1483607411" name="Text">
     </p:cNvPr>
           <p:cNvSpPr>
             <a:spLocks noGrp="1"/>
@@ -2604,14 +2636,14 @@
                 <a:ea typeface="맑은 고딕"/>
                 <a:cs typeface="맑은 고딕"/>
               </a:rPr>
-              <a:t> </a:t>
-            </a:r>
-          </a:p>
-        </p:txBody>
-      </p:sp>
-      <p:sp>
-        <p:nvSpPr>
-          <p:cNvPr id="1630076073" name="Text">
+              <a:t>sds</a:t>
+            </a:r>
+          </a:p>
+        </p:txBody>
+      </p:sp>
+      <p:sp>
+        <p:nvSpPr>
+          <p:cNvPr id="345230294" name="Text">
     </p:cNvPr>
           <p:cNvSpPr>
             <a:spLocks noGrp="1"/>
@@ -2656,14 +2688,14 @@
                 <a:ea typeface="맑은 고딕"/>
                 <a:cs typeface="맑은 고딕"/>
               </a:rPr>
-              <a:t>jelee01</a:t>
-            </a:r>
-          </a:p>
-        </p:txBody>
-      </p:sp>
-      <p:sp>
-        <p:nvSpPr>
-          <p:cNvPr id="652856474" name="Text">
+              <a:t>44</a:t>
+            </a:r>
+          </a:p>
+        </p:txBody>
+      </p:sp>
+      <p:sp>
+        <p:nvSpPr>
+          <p:cNvPr id="627840511" name="Text">
     </p:cNvPr>
           <p:cNvSpPr>
             <a:spLocks noGrp="1"/>
@@ -2718,7 +2750,7 @@
       </p:sp>
       <p:sp>
         <p:nvSpPr>
-          <p:cNvPr id="1053833990" name="Text">
+          <p:cNvPr id="256471208" name="Text">
     </p:cNvPr>
           <p:cNvSpPr>
             <a:spLocks noGrp="1"/>
@@ -2763,14 +2795,14 @@
                 <a:ea typeface="맑은 고딕"/>
                 <a:cs typeface="맑은 고딕"/>
               </a:rPr>
-              <a:t> </a:t>
-            </a:r>
-          </a:p>
-        </p:txBody>
-      </p:sp>
-      <p:sp>
-        <p:nvSpPr>
-          <p:cNvPr id="1804976502" name="Text">
+              <a:t>ewefw</a:t>
+            </a:r>
+          </a:p>
+        </p:txBody>
+      </p:sp>
+      <p:sp>
+        <p:nvSpPr>
+          <p:cNvPr id="660926887" name="Text">
     </p:cNvPr>
           <p:cNvSpPr>
             <a:spLocks noGrp="1"/>
@@ -2825,7 +2857,7 @@
       </p:sp>
       <p:sp>
         <p:nvSpPr>
-          <p:cNvPr id="1300145433" name="Text">
+          <p:cNvPr id="765678566" name="Text">
     </p:cNvPr>
           <p:cNvSpPr>
             <a:spLocks noGrp="1"/>
@@ -2870,14 +2902,14 @@
                 <a:ea typeface="맑은 고딕"/>
                 <a:cs typeface="맑은 고딕"/>
               </a:rPr>
-              <a:t>일반</a:t>
-            </a:r>
-          </a:p>
-        </p:txBody>
-      </p:sp>
-      <p:sp>
-        <p:nvSpPr>
-          <p:cNvPr id="630926640" name="Text">
+              <a:t>435</a:t>
+            </a:r>
+          </a:p>
+        </p:txBody>
+      </p:sp>
+      <p:sp>
+        <p:nvSpPr>
+          <p:cNvPr id="1747281984" name="Text">
     </p:cNvPr>
           <p:cNvSpPr>
             <a:spLocks noGrp="1"/>
@@ -2923,7 +2955,7 @@
       </p:sp>
       <p:pic>
         <p:nvPicPr>
-          <p:cNvPr id="436320864" name="Picture">
+          <p:cNvPr id="1483467371" name="Picture">
     </p:cNvPr>
           <p:cNvPicPr>
             <a:picLocks noChangeAspect="1"/>

</xml_diff>